<commit_message>
Updated feedback QR codes
</commit_message>
<xml_diff>
--- a/TugaITLisbon2017/A brave new world – Mac OS X, PowerShell and Linux/A brave new world – Mac OS X, PowerShell and Linux.pptx
+++ b/TugaITLisbon2017/A brave new world – Mac OS X, PowerShell and Linux/A brave new world – Mac OS X, PowerShell and Linux.pptx
@@ -15,7 +15,8 @@
     <p:sldId id="281" r:id="rId9"/>
     <p:sldId id="283" r:id="rId10"/>
     <p:sldId id="280" r:id="rId11"/>
-    <p:sldId id="262" r:id="rId12"/>
+    <p:sldId id="284" r:id="rId12"/>
+    <p:sldId id="262" r:id="rId13"/>
   </p:sldIdLst>
   <p:sldSz cx="12192000" cy="6858000"/>
   <p:notesSz cx="6858000" cy="9144000"/>
@@ -187,20 +188,28 @@
           <pc:docMk/>
           <pc:sldMk cId="1816546577" sldId="273"/>
         </pc:sldMkLst>
+        <pc:spChg chg="add">
+          <ac:chgData name="Jaap Brasser" userId="94b91a340a22cdbc" providerId="LiveId" clId="{961E1374-A4B5-497B-B04D-2DA06C418DFE}" dt="2017-05-20T14:32:01.089" v="148" actId="26606"/>
+          <ac:spMkLst>
+            <pc:docMk/>
+            <pc:sldMk cId="1816546577" sldId="273"/>
+            <ac:spMk id="1037" creationId="{00000000-0000-0000-0000-000000000000}"/>
+          </ac:spMkLst>
+        </pc:spChg>
+        <pc:spChg chg="add mod ord">
+          <ac:chgData name="Jaap Brasser" userId="94b91a340a22cdbc" providerId="LiveId" clId="{961E1374-A4B5-497B-B04D-2DA06C418DFE}" dt="2017-05-20T14:32:22.799" v="177" actId="14100"/>
+          <ac:spMkLst>
+            <pc:docMk/>
+            <pc:sldMk cId="1816546577" sldId="273"/>
+            <ac:spMk id="4" creationId="{20D04BAA-96F5-47C3-B3DF-E0951D987CD9}"/>
+          </ac:spMkLst>
+        </pc:spChg>
         <pc:spChg chg="del">
           <ac:chgData name="Jaap Brasser" userId="94b91a340a22cdbc" providerId="LiveId" clId="{961E1374-A4B5-497B-B04D-2DA06C418DFE}" dt="2017-05-20T13:45:54.636" v="46" actId="0"/>
           <ac:spMkLst>
             <pc:docMk/>
             <pc:sldMk cId="1816546577" sldId="273"/>
             <ac:spMk id="7" creationId="{00000000-0000-0000-0000-000000000000}"/>
-          </ac:spMkLst>
-        </pc:spChg>
-        <pc:spChg chg="add">
-          <ac:chgData name="Jaap Brasser" userId="94b91a340a22cdbc" providerId="LiveId" clId="{961E1374-A4B5-497B-B04D-2DA06C418DFE}" dt="2017-05-20T14:32:01.089" v="148" actId="26606"/>
-          <ac:spMkLst>
-            <pc:docMk/>
-            <pc:sldMk cId="1816546577" sldId="273"/>
-            <ac:spMk id="1037" creationId="{00000000-0000-0000-0000-000000000000}"/>
           </ac:spMkLst>
         </pc:spChg>
         <pc:spChg chg="del">
@@ -211,20 +220,20 @@
             <ac:spMk id="1032" creationId="{00000000-0000-0000-0000-000000000000}"/>
           </ac:spMkLst>
         </pc:spChg>
-        <pc:spChg chg="add mod ord">
-          <ac:chgData name="Jaap Brasser" userId="94b91a340a22cdbc" providerId="LiveId" clId="{961E1374-A4B5-497B-B04D-2DA06C418DFE}" dt="2017-05-20T14:32:22.799" v="177" actId="14100"/>
-          <ac:spMkLst>
-            <pc:docMk/>
-            <pc:sldMk cId="1816546577" sldId="273"/>
-            <ac:spMk id="4" creationId="{20D04BAA-96F5-47C3-B3DF-E0951D987CD9}"/>
-          </ac:spMkLst>
-        </pc:spChg>
         <pc:picChg chg="add mod">
           <ac:chgData name="Jaap Brasser" userId="94b91a340a22cdbc" providerId="LiveId" clId="{961E1374-A4B5-497B-B04D-2DA06C418DFE}" dt="2017-05-20T14:32:01.089" v="148" actId="26606"/>
           <ac:picMkLst>
             <pc:docMk/>
             <pc:sldMk cId="1816546577" sldId="273"/>
             <ac:picMk id="1026" creationId="{CDDF8243-4C6B-4A22-993A-C12F6974DCE2}"/>
+          </ac:picMkLst>
+        </pc:picChg>
+        <pc:picChg chg="del">
+          <ac:chgData name="Jaap Brasser" userId="94b91a340a22cdbc" providerId="LiveId" clId="{961E1374-A4B5-497B-B04D-2DA06C418DFE}" dt="2017-05-20T13:45:30.870" v="43" actId="478"/>
+          <ac:picMkLst>
+            <pc:docMk/>
+            <pc:sldMk cId="1816546577" sldId="273"/>
+            <ac:picMk id="3" creationId="{00000000-0000-0000-0000-000000000000}"/>
           </ac:picMkLst>
         </pc:picChg>
         <pc:picChg chg="add del mod ord">
@@ -235,28 +244,20 @@
             <ac:picMk id="2" creationId="{187A8B96-9B27-4CF8-95E5-F3831E5F6618}"/>
           </ac:picMkLst>
         </pc:picChg>
-        <pc:picChg chg="del">
-          <ac:chgData name="Jaap Brasser" userId="94b91a340a22cdbc" providerId="LiveId" clId="{961E1374-A4B5-497B-B04D-2DA06C418DFE}" dt="2017-05-20T13:45:30.870" v="43" actId="478"/>
-          <ac:picMkLst>
+        <pc:cxnChg chg="del">
+          <ac:chgData name="Jaap Brasser" userId="94b91a340a22cdbc" providerId="LiveId" clId="{961E1374-A4B5-497B-B04D-2DA06C418DFE}" dt="2017-05-20T14:32:01.089" v="148" actId="26606"/>
+          <ac:cxnSpMkLst>
             <pc:docMk/>
             <pc:sldMk cId="1816546577" sldId="273"/>
-            <ac:picMk id="3" creationId="{00000000-0000-0000-0000-000000000000}"/>
-          </ac:picMkLst>
-        </pc:picChg>
+            <ac:cxnSpMk id="74" creationId="{00000000-0000-0000-0000-000000000000}"/>
+          </ac:cxnSpMkLst>
+        </pc:cxnChg>
         <pc:cxnChg chg="add">
           <ac:chgData name="Jaap Brasser" userId="94b91a340a22cdbc" providerId="LiveId" clId="{961E1374-A4B5-497B-B04D-2DA06C418DFE}" dt="2017-05-20T14:32:01.089" v="148" actId="26606"/>
           <ac:cxnSpMkLst>
             <pc:docMk/>
             <pc:sldMk cId="1816546577" sldId="273"/>
             <ac:cxnSpMk id="143" creationId="{00000000-0000-0000-0000-000000000000}"/>
-          </ac:cxnSpMkLst>
-        </pc:cxnChg>
-        <pc:cxnChg chg="del">
-          <ac:chgData name="Jaap Brasser" userId="94b91a340a22cdbc" providerId="LiveId" clId="{961E1374-A4B5-497B-B04D-2DA06C418DFE}" dt="2017-05-20T14:32:01.089" v="148" actId="26606"/>
-          <ac:cxnSpMkLst>
-            <pc:docMk/>
-            <pc:sldMk cId="1816546577" sldId="273"/>
-            <ac:cxnSpMk id="74" creationId="{00000000-0000-0000-0000-000000000000}"/>
           </ac:cxnSpMkLst>
         </pc:cxnChg>
       </pc:sldChg>
@@ -316,6 +317,14 @@
             <ac:spMk id="1032" creationId="{00000000-0000-0000-0000-000000000000}"/>
           </ac:spMkLst>
         </pc:spChg>
+        <pc:spChg chg="add">
+          <ac:chgData name="Jaap Brasser" userId="94b91a340a22cdbc" providerId="LiveId" clId="{961E1374-A4B5-497B-B04D-2DA06C418DFE}" dt="2017-05-20T14:38:45.155" v="244" actId="26606"/>
+          <ac:spMkLst>
+            <pc:docMk/>
+            <pc:sldMk cId="3596356869" sldId="280"/>
+            <ac:spMk id="2055" creationId="{00000000-0000-0000-0000-000000000000}"/>
+          </ac:spMkLst>
+        </pc:spChg>
         <pc:spChg chg="mod ord">
           <ac:chgData name="Jaap Brasser" userId="94b91a340a22cdbc" providerId="LiveId" clId="{961E1374-A4B5-497B-B04D-2DA06C418DFE}" dt="2017-05-20T15:21:37.007" v="418" actId="20577"/>
           <ac:spMkLst>
@@ -330,14 +339,6 @@
             <pc:docMk/>
             <pc:sldMk cId="3596356869" sldId="280"/>
             <ac:spMk id="73" creationId="{00000000-0000-0000-0000-000000000000}"/>
-          </ac:spMkLst>
-        </pc:spChg>
-        <pc:spChg chg="add">
-          <ac:chgData name="Jaap Brasser" userId="94b91a340a22cdbc" providerId="LiveId" clId="{961E1374-A4B5-497B-B04D-2DA06C418DFE}" dt="2017-05-20T14:38:45.155" v="244" actId="26606"/>
-          <ac:spMkLst>
-            <pc:docMk/>
-            <pc:sldMk cId="3596356869" sldId="280"/>
-            <ac:spMk id="2055" creationId="{00000000-0000-0000-0000-000000000000}"/>
           </ac:spMkLst>
         </pc:spChg>
         <pc:picChg chg="del">
@@ -413,7 +414,31 @@
           <ac:spMkLst>
             <pc:docMk/>
             <pc:sldMk cId="2738041705" sldId="283"/>
+            <ac:spMk id="12" creationId="{00000000-0000-0000-0000-000000000000}"/>
+          </ac:spMkLst>
+        </pc:spChg>
+        <pc:spChg chg="add del">
+          <ac:chgData name="Jaap Brasser" userId="94b91a340a22cdbc" providerId="LiveId" clId="{961E1374-A4B5-497B-B04D-2DA06C418DFE}" dt="2017-05-20T15:13:41.508" v="339" actId="0"/>
+          <ac:spMkLst>
+            <pc:docMk/>
+            <pc:sldMk cId="2738041705" sldId="283"/>
+            <ac:spMk id="15" creationId="{00000000-0000-0000-0000-000000000000}"/>
+          </ac:spMkLst>
+        </pc:spChg>
+        <pc:spChg chg="add del">
+          <ac:chgData name="Jaap Brasser" userId="94b91a340a22cdbc" providerId="LiveId" clId="{961E1374-A4B5-497B-B04D-2DA06C418DFE}" dt="2017-05-20T15:13:41.508" v="339" actId="0"/>
+          <ac:spMkLst>
+            <pc:docMk/>
+            <pc:sldMk cId="2738041705" sldId="283"/>
             <ac:spMk id="11" creationId="{00000000-0000-0000-0000-000000000000}"/>
+          </ac:spMkLst>
+        </pc:spChg>
+        <pc:spChg chg="add del">
+          <ac:chgData name="Jaap Brasser" userId="94b91a340a22cdbc" providerId="LiveId" clId="{961E1374-A4B5-497B-B04D-2DA06C418DFE}" dt="2017-05-20T15:13:41.508" v="339" actId="0"/>
+          <ac:spMkLst>
+            <pc:docMk/>
+            <pc:sldMk cId="2738041705" sldId="283"/>
+            <ac:spMk id="9" creationId="{00000000-0000-0000-0000-000000000000}"/>
           </ac:spMkLst>
         </pc:spChg>
         <pc:spChg chg="add del">
@@ -429,31 +454,7 @@
           <ac:spMkLst>
             <pc:docMk/>
             <pc:sldMk cId="2738041705" sldId="283"/>
-            <ac:spMk id="15" creationId="{00000000-0000-0000-0000-000000000000}"/>
-          </ac:spMkLst>
-        </pc:spChg>
-        <pc:spChg chg="add del">
-          <ac:chgData name="Jaap Brasser" userId="94b91a340a22cdbc" providerId="LiveId" clId="{961E1374-A4B5-497B-B04D-2DA06C418DFE}" dt="2017-05-20T15:13:41.508" v="339" actId="0"/>
-          <ac:spMkLst>
-            <pc:docMk/>
-            <pc:sldMk cId="2738041705" sldId="283"/>
             <ac:spMk id="13" creationId="{00000000-0000-0000-0000-000000000000}"/>
-          </ac:spMkLst>
-        </pc:spChg>
-        <pc:spChg chg="add del">
-          <ac:chgData name="Jaap Brasser" userId="94b91a340a22cdbc" providerId="LiveId" clId="{961E1374-A4B5-497B-B04D-2DA06C418DFE}" dt="2017-05-20T15:13:41.508" v="339" actId="0"/>
-          <ac:spMkLst>
-            <pc:docMk/>
-            <pc:sldMk cId="2738041705" sldId="283"/>
-            <ac:spMk id="9" creationId="{00000000-0000-0000-0000-000000000000}"/>
-          </ac:spMkLst>
-        </pc:spChg>
-        <pc:spChg chg="add del">
-          <ac:chgData name="Jaap Brasser" userId="94b91a340a22cdbc" providerId="LiveId" clId="{961E1374-A4B5-497B-B04D-2DA06C418DFE}" dt="2017-05-20T15:13:41.508" v="339" actId="0"/>
-          <ac:spMkLst>
-            <pc:docMk/>
-            <pc:sldMk cId="2738041705" sldId="283"/>
-            <ac:spMk id="12" creationId="{00000000-0000-0000-0000-000000000000}"/>
           </ac:spMkLst>
         </pc:spChg>
       </pc:sldChg>
@@ -461,8 +462,8 @@
   </pc:docChgLst>
   <pc:docChgLst>
     <pc:chgData name="Jaap Brasser" userId="205aafbf-e7ed-4c9d-a4cb-e309a2cd0c82" providerId="ADAL" clId="{9A945EF2-7ED2-4CCE-99D3-AFF783944866}"/>
-    <pc:docChg chg="modSld">
-      <pc:chgData name="Jaap Brasser" userId="205aafbf-e7ed-4c9d-a4cb-e309a2cd0c82" providerId="ADAL" clId="{9A945EF2-7ED2-4CCE-99D3-AFF783944866}" dt="2017-05-21T21:28:50.422" v="2" actId="20577"/>
+    <pc:docChg chg="addSld modSld">
+      <pc:chgData name="Jaap Brasser" userId="205aafbf-e7ed-4c9d-a4cb-e309a2cd0c82" providerId="ADAL" clId="{9A945EF2-7ED2-4CCE-99D3-AFF783944866}" dt="2017-05-22T13:06:35.971" v="3" actId="0"/>
       <pc:docMkLst>
         <pc:docMk/>
       </pc:docMkLst>
@@ -480,6 +481,13 @@
             <ac:spMk id="5" creationId="{00000000-0000-0000-0000-000000000000}"/>
           </ac:spMkLst>
         </pc:spChg>
+      </pc:sldChg>
+      <pc:sldChg chg="add">
+        <pc:chgData name="Jaap Brasser" userId="205aafbf-e7ed-4c9d-a4cb-e309a2cd0c82" providerId="ADAL" clId="{9A945EF2-7ED2-4CCE-99D3-AFF783944866}" dt="2017-05-22T13:06:35.971" v="3" actId="0"/>
+        <pc:sldMkLst>
+          <pc:docMk/>
+          <pc:sldMk cId="479607676" sldId="284"/>
+        </pc:sldMkLst>
       </pc:sldChg>
     </pc:docChg>
   </pc:docChgLst>
@@ -617,7 +625,7 @@
           <a:p>
             <a:fld id="{0E9FF321-A082-456B-A347-A910A2958839}" type="datetimeFigureOut">
               <a:rPr lang="pt-PT" smtClean="0"/>
-              <a:t>21/05/2017</a:t>
+              <a:t>22/05/2017</a:t>
             </a:fld>
             <a:endParaRPr lang="pt-PT"/>
           </a:p>
@@ -787,7 +795,7 @@
           <a:p>
             <a:fld id="{0E9FF321-A082-456B-A347-A910A2958839}" type="datetimeFigureOut">
               <a:rPr lang="pt-PT" smtClean="0"/>
-              <a:t>21/05/2017</a:t>
+              <a:t>22/05/2017</a:t>
             </a:fld>
             <a:endParaRPr lang="pt-PT"/>
           </a:p>
@@ -967,7 +975,7 @@
           <a:p>
             <a:fld id="{0E9FF321-A082-456B-A347-A910A2958839}" type="datetimeFigureOut">
               <a:rPr lang="pt-PT" smtClean="0"/>
-              <a:t>21/05/2017</a:t>
+              <a:t>22/05/2017</a:t>
             </a:fld>
             <a:endParaRPr lang="pt-PT"/>
           </a:p>
@@ -1157,7 +1165,7 @@
           <a:p>
             <a:fld id="{DF8A5735-89E3-4EB8-996C-DCBFF46A8144}" type="datetimeFigureOut">
               <a:rPr lang="en-US" smtClean="0"/>
-              <a:t>2017-05-21</a:t>
+              <a:t>2017-05-22</a:t>
             </a:fld>
             <a:endParaRPr lang="en-US"/>
           </a:p>
@@ -1325,7 +1333,7 @@
           <a:p>
             <a:fld id="{DF8A5735-89E3-4EB8-996C-DCBFF46A8144}" type="datetimeFigureOut">
               <a:rPr lang="en-US" smtClean="0"/>
-              <a:t>2017-05-21</a:t>
+              <a:t>2017-05-22</a:t>
             </a:fld>
             <a:endParaRPr lang="en-US"/>
           </a:p>
@@ -1570,7 +1578,7 @@
           <a:p>
             <a:fld id="{DF8A5735-89E3-4EB8-996C-DCBFF46A8144}" type="datetimeFigureOut">
               <a:rPr lang="en-US" smtClean="0"/>
-              <a:t>2017-05-21</a:t>
+              <a:t>2017-05-22</a:t>
             </a:fld>
             <a:endParaRPr lang="en-US"/>
           </a:p>
@@ -1799,7 +1807,7 @@
           <a:p>
             <a:fld id="{DF8A5735-89E3-4EB8-996C-DCBFF46A8144}" type="datetimeFigureOut">
               <a:rPr lang="en-US" smtClean="0"/>
-              <a:t>2017-05-21</a:t>
+              <a:t>2017-05-22</a:t>
             </a:fld>
             <a:endParaRPr lang="en-US"/>
           </a:p>
@@ -2163,7 +2171,7 @@
           <a:p>
             <a:fld id="{DF8A5735-89E3-4EB8-996C-DCBFF46A8144}" type="datetimeFigureOut">
               <a:rPr lang="en-US" smtClean="0"/>
-              <a:t>2017-05-21</a:t>
+              <a:t>2017-05-22</a:t>
             </a:fld>
             <a:endParaRPr lang="en-US"/>
           </a:p>
@@ -2280,7 +2288,7 @@
           <a:p>
             <a:fld id="{DF8A5735-89E3-4EB8-996C-DCBFF46A8144}" type="datetimeFigureOut">
               <a:rPr lang="en-US" smtClean="0"/>
-              <a:t>2017-05-21</a:t>
+              <a:t>2017-05-22</a:t>
             </a:fld>
             <a:endParaRPr lang="en-US"/>
           </a:p>
@@ -2375,7 +2383,7 @@
           <a:p>
             <a:fld id="{DF8A5735-89E3-4EB8-996C-DCBFF46A8144}" type="datetimeFigureOut">
               <a:rPr lang="en-US" smtClean="0"/>
-              <a:t>2017-05-21</a:t>
+              <a:t>2017-05-22</a:t>
             </a:fld>
             <a:endParaRPr lang="en-US"/>
           </a:p>
@@ -2650,7 +2658,7 @@
           <a:p>
             <a:fld id="{DF8A5735-89E3-4EB8-996C-DCBFF46A8144}" type="datetimeFigureOut">
               <a:rPr lang="en-US" smtClean="0"/>
-              <a:t>2017-05-21</a:t>
+              <a:t>2017-05-22</a:t>
             </a:fld>
             <a:endParaRPr lang="en-US"/>
           </a:p>
@@ -2820,7 +2828,7 @@
           <a:p>
             <a:fld id="{0E9FF321-A082-456B-A347-A910A2958839}" type="datetimeFigureOut">
               <a:rPr lang="pt-PT" smtClean="0"/>
-              <a:t>21/05/2017</a:t>
+              <a:t>22/05/2017</a:t>
             </a:fld>
             <a:endParaRPr lang="pt-PT"/>
           </a:p>
@@ -3072,7 +3080,7 @@
           <a:p>
             <a:fld id="{DF8A5735-89E3-4EB8-996C-DCBFF46A8144}" type="datetimeFigureOut">
               <a:rPr lang="en-US" smtClean="0"/>
-              <a:t>2017-05-21</a:t>
+              <a:t>2017-05-22</a:t>
             </a:fld>
             <a:endParaRPr lang="en-US"/>
           </a:p>
@@ -3240,7 +3248,7 @@
           <a:p>
             <a:fld id="{DF8A5735-89E3-4EB8-996C-DCBFF46A8144}" type="datetimeFigureOut">
               <a:rPr lang="en-US" smtClean="0"/>
-              <a:t>2017-05-21</a:t>
+              <a:t>2017-05-22</a:t>
             </a:fld>
             <a:endParaRPr lang="en-US"/>
           </a:p>
@@ -3418,7 +3426,7 @@
           <a:p>
             <a:fld id="{DF8A5735-89E3-4EB8-996C-DCBFF46A8144}" type="datetimeFigureOut">
               <a:rPr lang="en-US" smtClean="0"/>
-              <a:t>2017-05-21</a:t>
+              <a:t>2017-05-22</a:t>
             </a:fld>
             <a:endParaRPr lang="en-US"/>
           </a:p>
@@ -3664,7 +3672,7 @@
           <a:p>
             <a:fld id="{0E9FF321-A082-456B-A347-A910A2958839}" type="datetimeFigureOut">
               <a:rPr lang="pt-PT" smtClean="0"/>
-              <a:t>21/05/2017</a:t>
+              <a:t>22/05/2017</a:t>
             </a:fld>
             <a:endParaRPr lang="pt-PT"/>
           </a:p>
@@ -3896,7 +3904,7 @@
           <a:p>
             <a:fld id="{0E9FF321-A082-456B-A347-A910A2958839}" type="datetimeFigureOut">
               <a:rPr lang="pt-PT" smtClean="0"/>
-              <a:t>21/05/2017</a:t>
+              <a:t>22/05/2017</a:t>
             </a:fld>
             <a:endParaRPr lang="pt-PT"/>
           </a:p>
@@ -4263,7 +4271,7 @@
           <a:p>
             <a:fld id="{0E9FF321-A082-456B-A347-A910A2958839}" type="datetimeFigureOut">
               <a:rPr lang="pt-PT" smtClean="0"/>
-              <a:t>21/05/2017</a:t>
+              <a:t>22/05/2017</a:t>
             </a:fld>
             <a:endParaRPr lang="pt-PT"/>
           </a:p>
@@ -4381,7 +4389,7 @@
           <a:p>
             <a:fld id="{0E9FF321-A082-456B-A347-A910A2958839}" type="datetimeFigureOut">
               <a:rPr lang="pt-PT" smtClean="0"/>
-              <a:t>21/05/2017</a:t>
+              <a:t>22/05/2017</a:t>
             </a:fld>
             <a:endParaRPr lang="pt-PT"/>
           </a:p>
@@ -4476,7 +4484,7 @@
           <a:p>
             <a:fld id="{0E9FF321-A082-456B-A347-A910A2958839}" type="datetimeFigureOut">
               <a:rPr lang="pt-PT" smtClean="0"/>
-              <a:t>21/05/2017</a:t>
+              <a:t>22/05/2017</a:t>
             </a:fld>
             <a:endParaRPr lang="pt-PT"/>
           </a:p>
@@ -4753,7 +4761,7 @@
           <a:p>
             <a:fld id="{0E9FF321-A082-456B-A347-A910A2958839}" type="datetimeFigureOut">
               <a:rPr lang="pt-PT" smtClean="0"/>
-              <a:t>21/05/2017</a:t>
+              <a:t>22/05/2017</a:t>
             </a:fld>
             <a:endParaRPr lang="pt-PT"/>
           </a:p>
@@ -5006,7 +5014,7 @@
           <a:p>
             <a:fld id="{0E9FF321-A082-456B-A347-A910A2958839}" type="datetimeFigureOut">
               <a:rPr lang="pt-PT" smtClean="0"/>
-              <a:t>21/05/2017</a:t>
+              <a:t>22/05/2017</a:t>
             </a:fld>
             <a:endParaRPr lang="pt-PT"/>
           </a:p>
@@ -5229,7 +5237,7 @@
           <a:p>
             <a:fld id="{0E9FF321-A082-456B-A347-A910A2958839}" type="datetimeFigureOut">
               <a:rPr lang="pt-PT" smtClean="0"/>
-              <a:t>21/05/2017</a:t>
+              <a:t>22/05/2017</a:t>
             </a:fld>
             <a:endParaRPr lang="pt-PT"/>
           </a:p>
@@ -5767,7 +5775,7 @@
           <a:p>
             <a:fld id="{DF8A5735-89E3-4EB8-996C-DCBFF46A8144}" type="datetimeFigureOut">
               <a:rPr lang="en-US" smtClean="0"/>
-              <a:t>2017-05-21</a:t>
+              <a:t>2017-05-22</a:t>
             </a:fld>
             <a:endParaRPr lang="en-US"/>
           </a:p>
@@ -6484,6 +6492,372 @@
 </file>
 
 <file path=ppt/slides/slide10.xml><?xml version="1.0" encoding="utf-8"?>
+<p:sld xmlns:a="http://schemas.openxmlformats.org/drawingml/2006/main" xmlns:r="http://schemas.openxmlformats.org/officeDocument/2006/relationships" xmlns:p="http://schemas.openxmlformats.org/presentationml/2006/main">
+  <p:cSld>
+    <p:spTree>
+      <p:nvGrpSpPr>
+        <p:cNvPr id="1" name=""/>
+        <p:cNvGrpSpPr/>
+        <p:nvPr/>
+      </p:nvGrpSpPr>
+      <p:grpSpPr>
+        <a:xfrm>
+          <a:off x="0" y="0"/>
+          <a:ext cx="0" cy="0"/>
+          <a:chOff x="0" y="0"/>
+          <a:chExt cx="0" cy="0"/>
+        </a:xfrm>
+      </p:grpSpPr>
+      <p:sp>
+        <p:nvSpPr>
+          <p:cNvPr id="2" name="Rectangle 1"/>
+          <p:cNvSpPr/>
+          <p:nvPr/>
+        </p:nvSpPr>
+        <p:spPr>
+          <a:xfrm>
+            <a:off x="0" y="1357745"/>
+            <a:ext cx="12192000" cy="4257965"/>
+          </a:xfrm>
+          <a:prstGeom prst="rect">
+            <a:avLst/>
+          </a:prstGeom>
+          <a:solidFill>
+            <a:schemeClr val="bg1"/>
+          </a:solidFill>
+          <a:ln>
+            <a:noFill/>
+          </a:ln>
+        </p:spPr>
+        <p:style>
+          <a:lnRef idx="2">
+            <a:schemeClr val="accent1">
+              <a:shade val="50000"/>
+            </a:schemeClr>
+          </a:lnRef>
+          <a:fillRef idx="1">
+            <a:schemeClr val="accent1"/>
+          </a:fillRef>
+          <a:effectRef idx="0">
+            <a:schemeClr val="accent1"/>
+          </a:effectRef>
+          <a:fontRef idx="minor">
+            <a:schemeClr val="lt1"/>
+          </a:fontRef>
+        </p:style>
+        <p:txBody>
+          <a:bodyPr rtlCol="0" anchor="ctr"/>
+          <a:lstStyle/>
+          <a:p>
+            <a:pPr algn="ctr"/>
+            <a:endParaRPr lang="en-US"/>
+          </a:p>
+        </p:txBody>
+      </p:sp>
+      <p:sp>
+        <p:nvSpPr>
+          <p:cNvPr id="12" name="TextBox 11"/>
+          <p:cNvSpPr txBox="1"/>
+          <p:nvPr/>
+        </p:nvSpPr>
+        <p:spPr>
+          <a:xfrm>
+            <a:off x="267855" y="63995"/>
+            <a:ext cx="11647054" cy="1200329"/>
+          </a:xfrm>
+          <a:prstGeom prst="rect">
+            <a:avLst/>
+          </a:prstGeom>
+          <a:noFill/>
+        </p:spPr>
+        <p:txBody>
+          <a:bodyPr wrap="square" rtlCol="0">
+            <a:spAutoFit/>
+          </a:bodyPr>
+          <a:lstStyle/>
+          <a:p>
+            <a:pPr algn="ctr"/>
+            <a:r>
+              <a:rPr lang="pt-PT" sz="7200" dirty="0">
+                <a:solidFill>
+                  <a:schemeClr val="tx1">
+                    <a:lumMod val="75000"/>
+                    <a:lumOff val="25000"/>
+                  </a:schemeClr>
+                </a:solidFill>
+                <a:latin typeface="Gill Sans MT Condensed" panose="020B0506020104020203" pitchFamily="34" charset="0"/>
+              </a:rPr>
+              <a:t>PLEASE FILL IN EVALUATION FORMS</a:t>
+            </a:r>
+          </a:p>
+        </p:txBody>
+      </p:sp>
+      <p:pic>
+        <p:nvPicPr>
+          <p:cNvPr id="19" name="Picture 18"/>
+          <p:cNvPicPr>
+            <a:picLocks noChangeAspect="1"/>
+          </p:cNvPicPr>
+          <p:nvPr/>
+        </p:nvPicPr>
+        <p:blipFill>
+          <a:blip r:embed="rId2">
+            <a:extLst>
+              <a:ext uri="{28A0092B-C50C-407E-A947-70E740481C1C}">
+                <a14:useLocalDpi xmlns:a14="http://schemas.microsoft.com/office/drawing/2010/main" val="0"/>
+              </a:ext>
+            </a:extLst>
+          </a:blip>
+          <a:stretch>
+            <a:fillRect/>
+          </a:stretch>
+        </p:blipFill>
+        <p:spPr>
+          <a:xfrm>
+            <a:off x="11126009" y="5781675"/>
+            <a:ext cx="1088709" cy="1080000"/>
+          </a:xfrm>
+          <a:prstGeom prst="rect">
+            <a:avLst/>
+          </a:prstGeom>
+        </p:spPr>
+      </p:pic>
+      <p:pic>
+        <p:nvPicPr>
+          <p:cNvPr id="5" name="Picture 4"/>
+          <p:cNvPicPr>
+            <a:picLocks noChangeAspect="1"/>
+          </p:cNvPicPr>
+          <p:nvPr/>
+        </p:nvPicPr>
+        <p:blipFill>
+          <a:blip r:embed="rId3">
+            <a:extLst>
+              <a:ext uri="{28A0092B-C50C-407E-A947-70E740481C1C}">
+                <a14:useLocalDpi xmlns:a14="http://schemas.microsoft.com/office/drawing/2010/main" val="0"/>
+              </a:ext>
+            </a:extLst>
+          </a:blip>
+          <a:stretch>
+            <a:fillRect/>
+          </a:stretch>
+        </p:blipFill>
+        <p:spPr>
+          <a:xfrm>
+            <a:off x="1159154" y="1801224"/>
+            <a:ext cx="3524250" cy="3524250"/>
+          </a:xfrm>
+          <a:prstGeom prst="rect">
+            <a:avLst/>
+          </a:prstGeom>
+        </p:spPr>
+      </p:pic>
+      <p:pic>
+        <p:nvPicPr>
+          <p:cNvPr id="8" name="Picture 7"/>
+          <p:cNvPicPr>
+            <a:picLocks noChangeAspect="1"/>
+          </p:cNvPicPr>
+          <p:nvPr/>
+        </p:nvPicPr>
+        <p:blipFill>
+          <a:blip r:embed="rId4">
+            <a:extLst>
+              <a:ext uri="{28A0092B-C50C-407E-A947-70E740481C1C}">
+                <a14:useLocalDpi xmlns:a14="http://schemas.microsoft.com/office/drawing/2010/main" val="0"/>
+              </a:ext>
+            </a:extLst>
+          </a:blip>
+          <a:stretch>
+            <a:fillRect/>
+          </a:stretch>
+        </p:blipFill>
+        <p:spPr>
+          <a:xfrm>
+            <a:off x="7348664" y="1801224"/>
+            <a:ext cx="3524250" cy="3524250"/>
+          </a:xfrm>
+          <a:prstGeom prst="rect">
+            <a:avLst/>
+          </a:prstGeom>
+        </p:spPr>
+      </p:pic>
+      <p:sp>
+        <p:nvSpPr>
+          <p:cNvPr id="3" name="TextBox 2"/>
+          <p:cNvSpPr txBox="1"/>
+          <p:nvPr/>
+        </p:nvSpPr>
+        <p:spPr>
+          <a:xfrm>
+            <a:off x="1977719" y="1558407"/>
+            <a:ext cx="1887120" cy="369332"/>
+          </a:xfrm>
+          <a:prstGeom prst="rect">
+            <a:avLst/>
+          </a:prstGeom>
+          <a:noFill/>
+        </p:spPr>
+        <p:txBody>
+          <a:bodyPr wrap="none" rtlCol="0">
+            <a:spAutoFit/>
+          </a:bodyPr>
+          <a:lstStyle/>
+          <a:p>
+            <a:r>
+              <a:rPr lang="pt-PT" dirty="0"/>
+              <a:t>FRIDAY, MAY 19th</a:t>
+            </a:r>
+            <a:endParaRPr lang="en-US" dirty="0"/>
+          </a:p>
+        </p:txBody>
+      </p:sp>
+      <p:sp>
+        <p:nvSpPr>
+          <p:cNvPr id="10" name="TextBox 9"/>
+          <p:cNvSpPr txBox="1"/>
+          <p:nvPr/>
+        </p:nvSpPr>
+        <p:spPr>
+          <a:xfrm>
+            <a:off x="8036007" y="1558407"/>
+            <a:ext cx="2149563" cy="369332"/>
+          </a:xfrm>
+          <a:prstGeom prst="rect">
+            <a:avLst/>
+          </a:prstGeom>
+          <a:noFill/>
+        </p:spPr>
+        <p:txBody>
+          <a:bodyPr wrap="none" rtlCol="0">
+            <a:spAutoFit/>
+          </a:bodyPr>
+          <a:lstStyle/>
+          <a:p>
+            <a:r>
+              <a:rPr lang="pt-PT" dirty="0"/>
+              <a:t>SATURDAY, MAY 20th</a:t>
+            </a:r>
+            <a:endParaRPr lang="en-US" dirty="0"/>
+          </a:p>
+        </p:txBody>
+      </p:sp>
+      <p:sp>
+        <p:nvSpPr>
+          <p:cNvPr id="6" name="TextBox 5"/>
+          <p:cNvSpPr txBox="1"/>
+          <p:nvPr/>
+        </p:nvSpPr>
+        <p:spPr>
+          <a:xfrm>
+            <a:off x="1061122" y="5187121"/>
+            <a:ext cx="3720314" cy="369332"/>
+          </a:xfrm>
+          <a:prstGeom prst="rect">
+            <a:avLst/>
+          </a:prstGeom>
+          <a:noFill/>
+        </p:spPr>
+        <p:txBody>
+          <a:bodyPr wrap="none" rtlCol="0">
+            <a:spAutoFit/>
+          </a:bodyPr>
+          <a:lstStyle/>
+          <a:p>
+            <a:r>
+              <a:rPr lang="en-US" u="sng">
+                <a:hlinkClick r:id="rId5"/>
+              </a:rPr>
+              <a:t>https://survs.com/survey/cprwce7pi8</a:t>
+            </a:r>
+            <a:endParaRPr lang="en-US" dirty="0"/>
+          </a:p>
+        </p:txBody>
+      </p:sp>
+      <p:sp>
+        <p:nvSpPr>
+          <p:cNvPr id="17" name="TextBox 16"/>
+          <p:cNvSpPr txBox="1"/>
+          <p:nvPr/>
+        </p:nvSpPr>
+        <p:spPr>
+          <a:xfrm>
+            <a:off x="7277337" y="5187121"/>
+            <a:ext cx="3666901" cy="369332"/>
+          </a:xfrm>
+          <a:prstGeom prst="rect">
+            <a:avLst/>
+          </a:prstGeom>
+          <a:noFill/>
+        </p:spPr>
+        <p:txBody>
+          <a:bodyPr wrap="none" rtlCol="0">
+            <a:spAutoFit/>
+          </a:bodyPr>
+          <a:lstStyle/>
+          <a:p>
+            <a:r>
+              <a:rPr lang="en-US" u="sng">
+                <a:hlinkClick r:id="rId6"/>
+              </a:rPr>
+              <a:t>https://survs.com/survey/l9kksmlzd8</a:t>
+            </a:r>
+            <a:endParaRPr lang="en-US" dirty="0"/>
+          </a:p>
+        </p:txBody>
+      </p:sp>
+      <p:sp>
+        <p:nvSpPr>
+          <p:cNvPr id="18" name="TextBox 17"/>
+          <p:cNvSpPr txBox="1"/>
+          <p:nvPr/>
+        </p:nvSpPr>
+        <p:spPr>
+          <a:xfrm>
+            <a:off x="1798674" y="5675746"/>
+            <a:ext cx="8594652" cy="1200329"/>
+          </a:xfrm>
+          <a:prstGeom prst="rect">
+            <a:avLst/>
+          </a:prstGeom>
+          <a:noFill/>
+        </p:spPr>
+        <p:txBody>
+          <a:bodyPr wrap="square" rtlCol="0">
+            <a:spAutoFit/>
+          </a:bodyPr>
+          <a:lstStyle/>
+          <a:p>
+            <a:pPr algn="ctr"/>
+            <a:r>
+              <a:rPr lang="pt-PT" sz="7200" dirty="0">
+                <a:solidFill>
+                  <a:schemeClr val="tx1">
+                    <a:lumMod val="75000"/>
+                    <a:lumOff val="25000"/>
+                  </a:schemeClr>
+                </a:solidFill>
+                <a:latin typeface="Gill Sans MT Condensed" panose="020B0506020104020203" pitchFamily="34" charset="0"/>
+              </a:rPr>
+              <a:t>YOUR OPINION IS IMPORTANT!</a:t>
+            </a:r>
+          </a:p>
+        </p:txBody>
+      </p:sp>
+    </p:spTree>
+    <p:extLst>
+      <p:ext uri="{BB962C8B-B14F-4D97-AF65-F5344CB8AC3E}">
+        <p14:creationId xmlns:p14="http://schemas.microsoft.com/office/powerpoint/2010/main" val="479607676"/>
+      </p:ext>
+    </p:extLst>
+  </p:cSld>
+  <p:clrMapOvr>
+    <a:masterClrMapping/>
+  </p:clrMapOvr>
+</p:sld>
+</file>
+
+<file path=ppt/slides/slide11.xml><?xml version="1.0" encoding="utf-8"?>
 <p:sld xmlns:a="http://schemas.openxmlformats.org/drawingml/2006/main" xmlns:r="http://schemas.openxmlformats.org/officeDocument/2006/relationships" xmlns:p="http://schemas.openxmlformats.org/presentationml/2006/main">
   <p:cSld>
     <p:spTree>

</xml_diff>